<commit_message>
Updated some graphs, added CPT summary
</commit_message>
<xml_diff>
--- a/output/images/raw/figure01_conceptual.pptx
+++ b/output/images/raw/figure01_conceptual.pptx
@@ -115,7 +115,7 @@
 <file path=ppt/revisionInfo.xml><?xml version="1.0" encoding="utf-8"?>
 <p1510:revInfo xmlns:a="http://schemas.openxmlformats.org/drawingml/2006/main" xmlns:r="http://schemas.openxmlformats.org/officeDocument/2006/relationships" xmlns:p1510="http://schemas.microsoft.com/office/powerpoint/2015/10/main">
   <p1510:revLst>
-    <p1510:client id="{EF6F24C5-38C6-4B78-ADE6-AEC5E0F11A2F}" v="38" dt="2023-02-06T08:33:25.062"/>
+    <p1510:client id="{EF6F24C5-38C6-4B78-ADE6-AEC5E0F11A2F}" v="67" dt="2023-02-20T14:04:15.732"/>
   </p1510:revLst>
 </p1510:revInfo>
 </file>
@@ -477,12 +477,12 @@
   <pc:docChgLst>
     <pc:chgData name="Sam Welch" userId="346ebfb30976329f" providerId="LiveId" clId="{EF6F24C5-38C6-4B78-ADE6-AEC5E0F11A2F}"/>
     <pc:docChg chg="undo custSel modSld">
-      <pc:chgData name="Sam Welch" userId="346ebfb30976329f" providerId="LiveId" clId="{EF6F24C5-38C6-4B78-ADE6-AEC5E0F11A2F}" dt="2023-02-06T08:33:25.061" v="1080" actId="164"/>
+      <pc:chgData name="Sam Welch" userId="346ebfb30976329f" providerId="LiveId" clId="{EF6F24C5-38C6-4B78-ADE6-AEC5E0F11A2F}" dt="2023-02-20T14:04:15.731" v="1167" actId="20577"/>
       <pc:docMkLst>
         <pc:docMk/>
       </pc:docMkLst>
       <pc:sldChg chg="addSp delSp modSp mod">
-        <pc:chgData name="Sam Welch" userId="346ebfb30976329f" providerId="LiveId" clId="{EF6F24C5-38C6-4B78-ADE6-AEC5E0F11A2F}" dt="2023-02-06T08:33:25.061" v="1080" actId="164"/>
+        <pc:chgData name="Sam Welch" userId="346ebfb30976329f" providerId="LiveId" clId="{EF6F24C5-38C6-4B78-ADE6-AEC5E0F11A2F}" dt="2023-02-20T14:04:15.731" v="1167" actId="20577"/>
         <pc:sldMkLst>
           <pc:docMk/>
           <pc:sldMk cId="997638543" sldId="256"/>
@@ -504,7 +504,7 @@
           </ac:spMkLst>
         </pc:spChg>
         <pc:spChg chg="add mod">
-          <ac:chgData name="Sam Welch" userId="346ebfb30976329f" providerId="LiveId" clId="{EF6F24C5-38C6-4B78-ADE6-AEC5E0F11A2F}" dt="2023-02-06T08:29:52.558" v="1013" actId="1076"/>
+          <ac:chgData name="Sam Welch" userId="346ebfb30976329f" providerId="LiveId" clId="{EF6F24C5-38C6-4B78-ADE6-AEC5E0F11A2F}" dt="2023-02-20T14:02:43.078" v="1157" actId="1037"/>
           <ac:spMkLst>
             <pc:docMk/>
             <pc:sldMk cId="997638543" sldId="256"/>
@@ -520,7 +520,7 @@
           </ac:spMkLst>
         </pc:spChg>
         <pc:spChg chg="mod">
-          <ac:chgData name="Sam Welch" userId="346ebfb30976329f" providerId="LiveId" clId="{EF6F24C5-38C6-4B78-ADE6-AEC5E0F11A2F}" dt="2023-02-06T08:10:28.692" v="872" actId="12789"/>
+          <ac:chgData name="Sam Welch" userId="346ebfb30976329f" providerId="LiveId" clId="{EF6F24C5-38C6-4B78-ADE6-AEC5E0F11A2F}" dt="2023-02-20T14:00:29.997" v="1081"/>
           <ac:spMkLst>
             <pc:docMk/>
             <pc:sldMk cId="997638543" sldId="256"/>
@@ -623,6 +623,14 @@
             <ac:spMk id="55" creationId="{9951FE14-827F-ADB1-02C0-F7C614B4A792}"/>
           </ac:spMkLst>
         </pc:spChg>
+        <pc:spChg chg="add del mod ord">
+          <ac:chgData name="Sam Welch" userId="346ebfb30976329f" providerId="LiveId" clId="{EF6F24C5-38C6-4B78-ADE6-AEC5E0F11A2F}" dt="2023-02-20T14:02:37.191" v="1143" actId="11529"/>
+          <ac:spMkLst>
+            <pc:docMk/>
+            <pc:sldMk cId="997638543" sldId="256"/>
+            <ac:spMk id="57" creationId="{CAFE7426-9177-4DE9-A4D1-D32AE7AD1C83}"/>
+          </ac:spMkLst>
+        </pc:spChg>
         <pc:spChg chg="mod">
           <ac:chgData name="Sam Welch" userId="346ebfb30976329f" providerId="LiveId" clId="{EF6F24C5-38C6-4B78-ADE6-AEC5E0F11A2F}" dt="2022-12-15T09:39:56.272" v="102" actId="20577"/>
           <ac:spMkLst>
@@ -632,7 +640,7 @@
           </ac:spMkLst>
         </pc:spChg>
         <pc:spChg chg="mod">
-          <ac:chgData name="Sam Welch" userId="346ebfb30976329f" providerId="LiveId" clId="{EF6F24C5-38C6-4B78-ADE6-AEC5E0F11A2F}" dt="2023-02-06T08:10:16.607" v="871" actId="255"/>
+          <ac:chgData name="Sam Welch" userId="346ebfb30976329f" providerId="LiveId" clId="{EF6F24C5-38C6-4B78-ADE6-AEC5E0F11A2F}" dt="2023-02-20T14:00:35.732" v="1084" actId="20577"/>
           <ac:spMkLst>
             <pc:docMk/>
             <pc:sldMk cId="997638543" sldId="256"/>
@@ -640,7 +648,7 @@
           </ac:spMkLst>
         </pc:spChg>
         <pc:spChg chg="mod">
-          <ac:chgData name="Sam Welch" userId="346ebfb30976329f" providerId="LiveId" clId="{EF6F24C5-38C6-4B78-ADE6-AEC5E0F11A2F}" dt="2023-02-06T08:20:32.095" v="949" actId="1076"/>
+          <ac:chgData name="Sam Welch" userId="346ebfb30976329f" providerId="LiveId" clId="{EF6F24C5-38C6-4B78-ADE6-AEC5E0F11A2F}" dt="2023-02-20T14:00:29.997" v="1081"/>
           <ac:spMkLst>
             <pc:docMk/>
             <pc:sldMk cId="997638543" sldId="256"/>
@@ -856,7 +864,7 @@
           </ac:spMkLst>
         </pc:spChg>
         <pc:spChg chg="mod">
-          <ac:chgData name="Sam Welch" userId="346ebfb30976329f" providerId="LiveId" clId="{EF6F24C5-38C6-4B78-ADE6-AEC5E0F11A2F}" dt="2023-02-06T08:17:05.691" v="888" actId="1076"/>
+          <ac:chgData name="Sam Welch" userId="346ebfb30976329f" providerId="LiveId" clId="{EF6F24C5-38C6-4B78-ADE6-AEC5E0F11A2F}" dt="2023-02-20T14:00:42.295" v="1085" actId="1076"/>
           <ac:spMkLst>
             <pc:docMk/>
             <pc:sldMk cId="997638543" sldId="256"/>
@@ -888,7 +896,7 @@
           </ac:spMkLst>
         </pc:spChg>
         <pc:spChg chg="mod topLvl">
-          <ac:chgData name="Sam Welch" userId="346ebfb30976329f" providerId="LiveId" clId="{EF6F24C5-38C6-4B78-ADE6-AEC5E0F11A2F}" dt="2023-02-06T08:18:20.185" v="907" actId="1076"/>
+          <ac:chgData name="Sam Welch" userId="346ebfb30976329f" providerId="LiveId" clId="{EF6F24C5-38C6-4B78-ADE6-AEC5E0F11A2F}" dt="2023-02-20T14:00:29.997" v="1081"/>
           <ac:spMkLst>
             <pc:docMk/>
             <pc:sldMk cId="997638543" sldId="256"/>
@@ -1039,6 +1047,14 @@
             <ac:spMk id="120" creationId="{13E43F6B-A69C-45D6-91DE-54E19619FBFD}"/>
           </ac:spMkLst>
         </pc:spChg>
+        <pc:spChg chg="add del mod ord">
+          <ac:chgData name="Sam Welch" userId="346ebfb30976329f" providerId="LiveId" clId="{EF6F24C5-38C6-4B78-ADE6-AEC5E0F11A2F}" dt="2023-02-20T14:02:30.947" v="1132"/>
+          <ac:spMkLst>
+            <pc:docMk/>
+            <pc:sldMk cId="997638543" sldId="256"/>
+            <ac:spMk id="121" creationId="{72AB8B73-9AA3-473C-8668-5BE412F97CD0}"/>
+          </ac:spMkLst>
+        </pc:spChg>
         <pc:spChg chg="add del mod">
           <ac:chgData name="Sam Welch" userId="346ebfb30976329f" providerId="LiveId" clId="{EF6F24C5-38C6-4B78-ADE6-AEC5E0F11A2F}" dt="2023-02-06T08:21:40.584" v="973" actId="478"/>
           <ac:spMkLst>
@@ -1088,7 +1104,7 @@
           </ac:spMkLst>
         </pc:spChg>
         <pc:spChg chg="add mod">
-          <ac:chgData name="Sam Welch" userId="346ebfb30976329f" providerId="LiveId" clId="{EF6F24C5-38C6-4B78-ADE6-AEC5E0F11A2F}" dt="2023-02-06T08:29:45.266" v="1012" actId="255"/>
+          <ac:chgData name="Sam Welch" userId="346ebfb30976329f" providerId="LiveId" clId="{EF6F24C5-38C6-4B78-ADE6-AEC5E0F11A2F}" dt="2023-02-20T14:04:15.731" v="1167" actId="20577"/>
           <ac:spMkLst>
             <pc:docMk/>
             <pc:sldMk cId="997638543" sldId="256"/>
@@ -1127,8 +1143,16 @@
             <ac:spMk id="133" creationId="{A688F398-0287-4EB4-8322-4638DD9AFC58}"/>
           </ac:spMkLst>
         </pc:spChg>
+        <pc:spChg chg="add del mod ord">
+          <ac:chgData name="Sam Welch" userId="346ebfb30976329f" providerId="LiveId" clId="{EF6F24C5-38C6-4B78-ADE6-AEC5E0F11A2F}" dt="2023-02-20T14:02:29.858" v="1129"/>
+          <ac:spMkLst>
+            <pc:docMk/>
+            <pc:sldMk cId="997638543" sldId="256"/>
+            <ac:spMk id="134" creationId="{166C04A3-28C4-494D-A225-0B5FAA44CD06}"/>
+          </ac:spMkLst>
+        </pc:spChg>
         <pc:grpChg chg="add mod">
-          <ac:chgData name="Sam Welch" userId="346ebfb30976329f" providerId="LiveId" clId="{EF6F24C5-38C6-4B78-ADE6-AEC5E0F11A2F}" dt="2023-02-06T08:10:37.850" v="875" actId="1076"/>
+          <ac:chgData name="Sam Welch" userId="346ebfb30976329f" providerId="LiveId" clId="{EF6F24C5-38C6-4B78-ADE6-AEC5E0F11A2F}" dt="2023-02-20T14:00:29.997" v="1081"/>
           <ac:grpSpMkLst>
             <pc:docMk/>
             <pc:sldMk cId="997638543" sldId="256"/>
@@ -1176,7 +1200,7 @@
           </ac:grpSpMkLst>
         </pc:grpChg>
         <pc:grpChg chg="mod">
-          <ac:chgData name="Sam Welch" userId="346ebfb30976329f" providerId="LiveId" clId="{EF6F24C5-38C6-4B78-ADE6-AEC5E0F11A2F}" dt="2023-02-06T08:10:36.475" v="874" actId="164"/>
+          <ac:chgData name="Sam Welch" userId="346ebfb30976329f" providerId="LiveId" clId="{EF6F24C5-38C6-4B78-ADE6-AEC5E0F11A2F}" dt="2023-02-20T14:00:29.997" v="1081"/>
           <ac:grpSpMkLst>
             <pc:docMk/>
             <pc:sldMk cId="997638543" sldId="256"/>
@@ -1200,7 +1224,7 @@
           </ac:grpSpMkLst>
         </pc:grpChg>
         <pc:grpChg chg="add mod">
-          <ac:chgData name="Sam Welch" userId="346ebfb30976329f" providerId="LiveId" clId="{EF6F24C5-38C6-4B78-ADE6-AEC5E0F11A2F}" dt="2023-02-06T08:20:22.468" v="939" actId="1076"/>
+          <ac:chgData name="Sam Welch" userId="346ebfb30976329f" providerId="LiveId" clId="{EF6F24C5-38C6-4B78-ADE6-AEC5E0F11A2F}" dt="2023-02-20T14:00:29.997" v="1081"/>
           <ac:grpSpMkLst>
             <pc:docMk/>
             <pc:sldMk cId="997638543" sldId="256"/>
@@ -1208,7 +1232,7 @@
           </ac:grpSpMkLst>
         </pc:grpChg>
         <pc:grpChg chg="add mod">
-          <ac:chgData name="Sam Welch" userId="346ebfb30976329f" providerId="LiveId" clId="{EF6F24C5-38C6-4B78-ADE6-AEC5E0F11A2F}" dt="2023-02-06T08:17:05.691" v="888" actId="1076"/>
+          <ac:chgData name="Sam Welch" userId="346ebfb30976329f" providerId="LiveId" clId="{EF6F24C5-38C6-4B78-ADE6-AEC5E0F11A2F}" dt="2023-02-20T14:00:42.295" v="1085" actId="1076"/>
           <ac:grpSpMkLst>
             <pc:docMk/>
             <pc:sldMk cId="997638543" sldId="256"/>
@@ -1216,7 +1240,7 @@
           </ac:grpSpMkLst>
         </pc:grpChg>
         <pc:grpChg chg="add mod">
-          <ac:chgData name="Sam Welch" userId="346ebfb30976329f" providerId="LiveId" clId="{EF6F24C5-38C6-4B78-ADE6-AEC5E0F11A2F}" dt="2023-02-06T08:20:35.498" v="950" actId="1076"/>
+          <ac:chgData name="Sam Welch" userId="346ebfb30976329f" providerId="LiveId" clId="{EF6F24C5-38C6-4B78-ADE6-AEC5E0F11A2F}" dt="2023-02-20T14:00:29.997" v="1081"/>
           <ac:grpSpMkLst>
             <pc:docMk/>
             <pc:sldMk cId="997638543" sldId="256"/>
@@ -1400,7 +1424,7 @@
           </ac:grpSpMkLst>
         </pc:grpChg>
         <pc:grpChg chg="mod">
-          <ac:chgData name="Sam Welch" userId="346ebfb30976329f" providerId="LiveId" clId="{EF6F24C5-38C6-4B78-ADE6-AEC5E0F11A2F}" dt="2023-02-06T08:11:03.585" v="883" actId="164"/>
+          <ac:chgData name="Sam Welch" userId="346ebfb30976329f" providerId="LiveId" clId="{EF6F24C5-38C6-4B78-ADE6-AEC5E0F11A2F}" dt="2023-02-20T14:00:29.997" v="1081"/>
           <ac:grpSpMkLst>
             <pc:docMk/>
             <pc:sldMk cId="997638543" sldId="256"/>
@@ -1408,7 +1432,7 @@
           </ac:grpSpMkLst>
         </pc:grpChg>
         <pc:grpChg chg="mod">
-          <ac:chgData name="Sam Welch" userId="346ebfb30976329f" providerId="LiveId" clId="{EF6F24C5-38C6-4B78-ADE6-AEC5E0F11A2F}" dt="2023-02-06T08:11:09.856" v="885" actId="164"/>
+          <ac:chgData name="Sam Welch" userId="346ebfb30976329f" providerId="LiveId" clId="{EF6F24C5-38C6-4B78-ADE6-AEC5E0F11A2F}" dt="2023-02-20T14:00:29.997" v="1081"/>
           <ac:grpSpMkLst>
             <pc:docMk/>
             <pc:sldMk cId="997638543" sldId="256"/>
@@ -2162,7 +2186,7 @@
           <a:p>
             <a:fld id="{FFCB109C-1392-4401-B401-9B62BF3E22B3}" type="datetimeFigureOut">
               <a:rPr lang="en-GB" smtClean="0"/>
-              <a:t>06/02/2023</a:t>
+              <a:t>20/02/2023</a:t>
             </a:fld>
             <a:endParaRPr lang="en-GB"/>
           </a:p>
@@ -2362,7 +2386,7 @@
           <a:p>
             <a:fld id="{FFCB109C-1392-4401-B401-9B62BF3E22B3}" type="datetimeFigureOut">
               <a:rPr lang="en-GB" smtClean="0"/>
-              <a:t>06/02/2023</a:t>
+              <a:t>20/02/2023</a:t>
             </a:fld>
             <a:endParaRPr lang="en-GB"/>
           </a:p>
@@ -2572,7 +2596,7 @@
           <a:p>
             <a:fld id="{FFCB109C-1392-4401-B401-9B62BF3E22B3}" type="datetimeFigureOut">
               <a:rPr lang="en-GB" smtClean="0"/>
-              <a:t>06/02/2023</a:t>
+              <a:t>20/02/2023</a:t>
             </a:fld>
             <a:endParaRPr lang="en-GB"/>
           </a:p>
@@ -2772,7 +2796,7 @@
           <a:p>
             <a:fld id="{FFCB109C-1392-4401-B401-9B62BF3E22B3}" type="datetimeFigureOut">
               <a:rPr lang="en-GB" smtClean="0"/>
-              <a:t>06/02/2023</a:t>
+              <a:t>20/02/2023</a:t>
             </a:fld>
             <a:endParaRPr lang="en-GB"/>
           </a:p>
@@ -3048,7 +3072,7 @@
           <a:p>
             <a:fld id="{FFCB109C-1392-4401-B401-9B62BF3E22B3}" type="datetimeFigureOut">
               <a:rPr lang="en-GB" smtClean="0"/>
-              <a:t>06/02/2023</a:t>
+              <a:t>20/02/2023</a:t>
             </a:fld>
             <a:endParaRPr lang="en-GB"/>
           </a:p>
@@ -3316,7 +3340,7 @@
           <a:p>
             <a:fld id="{FFCB109C-1392-4401-B401-9B62BF3E22B3}" type="datetimeFigureOut">
               <a:rPr lang="en-GB" smtClean="0"/>
-              <a:t>06/02/2023</a:t>
+              <a:t>20/02/2023</a:t>
             </a:fld>
             <a:endParaRPr lang="en-GB"/>
           </a:p>
@@ -3731,7 +3755,7 @@
           <a:p>
             <a:fld id="{FFCB109C-1392-4401-B401-9B62BF3E22B3}" type="datetimeFigureOut">
               <a:rPr lang="en-GB" smtClean="0"/>
-              <a:t>06/02/2023</a:t>
+              <a:t>20/02/2023</a:t>
             </a:fld>
             <a:endParaRPr lang="en-GB"/>
           </a:p>
@@ -3873,7 +3897,7 @@
           <a:p>
             <a:fld id="{FFCB109C-1392-4401-B401-9B62BF3E22B3}" type="datetimeFigureOut">
               <a:rPr lang="en-GB" smtClean="0"/>
-              <a:t>06/02/2023</a:t>
+              <a:t>20/02/2023</a:t>
             </a:fld>
             <a:endParaRPr lang="en-GB"/>
           </a:p>
@@ -3986,7 +4010,7 @@
           <a:p>
             <a:fld id="{FFCB109C-1392-4401-B401-9B62BF3E22B3}" type="datetimeFigureOut">
               <a:rPr lang="en-GB" smtClean="0"/>
-              <a:t>06/02/2023</a:t>
+              <a:t>20/02/2023</a:t>
             </a:fld>
             <a:endParaRPr lang="en-GB"/>
           </a:p>
@@ -4299,7 +4323,7 @@
           <a:p>
             <a:fld id="{FFCB109C-1392-4401-B401-9B62BF3E22B3}" type="datetimeFigureOut">
               <a:rPr lang="en-GB" smtClean="0"/>
-              <a:t>06/02/2023</a:t>
+              <a:t>20/02/2023</a:t>
             </a:fld>
             <a:endParaRPr lang="en-GB"/>
           </a:p>
@@ -4588,7 +4612,7 @@
           <a:p>
             <a:fld id="{FFCB109C-1392-4401-B401-9B62BF3E22B3}" type="datetimeFigureOut">
               <a:rPr lang="en-GB" smtClean="0"/>
-              <a:t>06/02/2023</a:t>
+              <a:t>20/02/2023</a:t>
             </a:fld>
             <a:endParaRPr lang="en-GB"/>
           </a:p>
@@ -4831,7 +4855,7 @@
           <a:p>
             <a:fld id="{FFCB109C-1392-4401-B401-9B62BF3E22B3}" type="datetimeFigureOut">
               <a:rPr lang="en-GB" smtClean="0"/>
-              <a:t>06/02/2023</a:t>
+              <a:t>20/02/2023</a:t>
             </a:fld>
             <a:endParaRPr lang="en-GB"/>
           </a:p>
@@ -5471,9 +5495,9 @@
         <p:grpSpPr>
           <a:xfrm>
             <a:off x="-129169" y="-1867523"/>
-            <a:ext cx="4867323" cy="1815882"/>
+            <a:ext cx="5983013" cy="1815882"/>
             <a:chOff x="955074" y="-1774290"/>
-            <a:chExt cx="4867323" cy="1815882"/>
+            <a:chExt cx="5983013" cy="1815882"/>
           </a:xfrm>
         </p:grpSpPr>
         <p:grpSp>
@@ -5491,9 +5515,9 @@
           <p:grpSpPr>
             <a:xfrm>
               <a:off x="1559135" y="-1774290"/>
-              <a:ext cx="4263262" cy="1815882"/>
+              <a:ext cx="5378952" cy="1815882"/>
               <a:chOff x="1215081" y="1038890"/>
-              <a:chExt cx="4263262" cy="1815882"/>
+              <a:chExt cx="5378952" cy="1815882"/>
             </a:xfrm>
           </p:grpSpPr>
           <p:pic>
@@ -5547,7 +5571,7 @@
             <p:spPr>
               <a:xfrm>
                 <a:off x="2214308" y="1038890"/>
-                <a:ext cx="3264035" cy="1815882"/>
+                <a:ext cx="4379725" cy="1815882"/>
               </a:xfrm>
               <a:prstGeom prst="rect">
                 <a:avLst/>
@@ -5565,7 +5589,7 @@
                     <a:latin typeface="Arial" panose="020B0604020202020204" pitchFamily="34" charset="0"/>
                     <a:cs typeface="Arial" panose="020B0604020202020204" pitchFamily="34" charset="0"/>
                   </a:rPr>
-                  <a:t>Historic Medicine </a:t>
+                  <a:t>Historic Pharmaceutical </a:t>
                 </a:r>
               </a:p>
               <a:p>
@@ -5999,9 +6023,9 @@
         <p:grpSpPr>
           <a:xfrm>
             <a:off x="3347880" y="2147303"/>
-            <a:ext cx="5690076" cy="969490"/>
+            <a:ext cx="5618005" cy="969490"/>
             <a:chOff x="2836269" y="2553344"/>
-            <a:chExt cx="5690076" cy="969490"/>
+            <a:chExt cx="5618005" cy="969490"/>
           </a:xfrm>
         </p:grpSpPr>
         <p:grpSp>
@@ -6019,9 +6043,9 @@
           <p:grpSpPr>
             <a:xfrm>
               <a:off x="3630429" y="2553344"/>
-              <a:ext cx="4895916" cy="969490"/>
+              <a:ext cx="4823845" cy="969490"/>
               <a:chOff x="725977" y="3952864"/>
-              <a:chExt cx="4895916" cy="969490"/>
+              <a:chExt cx="4823845" cy="969490"/>
             </a:xfrm>
           </p:grpSpPr>
           <p:sp>
@@ -6039,7 +6063,7 @@
             <p:spPr>
               <a:xfrm>
                 <a:off x="1569245" y="3968247"/>
-                <a:ext cx="4052648" cy="954107"/>
+                <a:ext cx="3980577" cy="954107"/>
               </a:xfrm>
               <a:prstGeom prst="rect">
                 <a:avLst/>
@@ -6057,7 +6081,7 @@
                     <a:latin typeface="Arial" panose="020B0604020202020204" pitchFamily="34" charset="0"/>
                     <a:cs typeface="Arial" panose="020B0604020202020204" pitchFamily="34" charset="0"/>
                   </a:rPr>
-                  <a:t>Medicine Sales Weight</a:t>
+                  <a:t>Pharmaceutical Sales </a:t>
                 </a:r>
               </a:p>
               <a:p>
@@ -6066,7 +6090,7 @@
                     <a:latin typeface="Arial" panose="020B0604020202020204" pitchFamily="34" charset="0"/>
                     <a:cs typeface="Arial" panose="020B0604020202020204" pitchFamily="34" charset="0"/>
                   </a:rPr>
-                  <a:t>Linear Models</a:t>
+                  <a:t>Weight Linear Models</a:t>
                 </a:r>
                 <a:endParaRPr lang="en-GB" sz="2800" dirty="0">
                   <a:latin typeface="Arial" panose="020B0604020202020204" pitchFamily="34" charset="0"/>
@@ -6165,9 +6189,9 @@
         <p:grpSpPr>
           <a:xfrm>
             <a:off x="3489266" y="3961882"/>
-            <a:ext cx="5307165" cy="990391"/>
+            <a:ext cx="6426061" cy="990391"/>
             <a:chOff x="2836269" y="4292609"/>
-            <a:chExt cx="5307165" cy="990391"/>
+            <a:chExt cx="6426061" cy="990391"/>
           </a:xfrm>
         </p:grpSpPr>
         <p:grpSp>
@@ -6185,9 +6209,9 @@
           <p:grpSpPr>
             <a:xfrm>
               <a:off x="3856226" y="4292609"/>
-              <a:ext cx="4287208" cy="990391"/>
+              <a:ext cx="5406104" cy="990391"/>
               <a:chOff x="4785797" y="1556683"/>
-              <a:chExt cx="4287208" cy="990391"/>
+              <a:chExt cx="5406104" cy="990391"/>
             </a:xfrm>
           </p:grpSpPr>
           <p:grpSp>
@@ -6297,7 +6321,7 @@
             <p:spPr>
               <a:xfrm>
                 <a:off x="5611801" y="1592967"/>
-                <a:ext cx="3461204" cy="954107"/>
+                <a:ext cx="4580100" cy="954107"/>
               </a:xfrm>
               <a:prstGeom prst="rect">
                 <a:avLst/>
@@ -6315,7 +6339,7 @@
                     <a:latin typeface="Arial" panose="020B0604020202020204" pitchFamily="34" charset="0"/>
                     <a:cs typeface="Arial" panose="020B0604020202020204" pitchFamily="34" charset="0"/>
                   </a:rPr>
-                  <a:t>Predicted Medicine</a:t>
+                  <a:t>Predicted Pharmaceutical</a:t>
                 </a:r>
               </a:p>
               <a:p>
@@ -7055,7 +7079,7 @@
         </p:nvGrpSpPr>
         <p:grpSpPr>
           <a:xfrm>
-            <a:off x="8993016" y="2332160"/>
+            <a:off x="9484364" y="1931696"/>
             <a:ext cx="5149211" cy="1384995"/>
             <a:chOff x="8443616" y="2313751"/>
             <a:chExt cx="5149211" cy="1384995"/>
@@ -7390,7 +7414,7 @@
         </p:nvSpPr>
         <p:spPr>
           <a:xfrm rot="5400000">
-            <a:off x="8660229" y="2804258"/>
+            <a:off x="9151577" y="2403794"/>
             <a:ext cx="190500" cy="479543"/>
           </a:xfrm>
           <a:prstGeom prst="downArrow">
@@ -7651,8 +7675,8 @@
           </p:txBody>
         </p:sp>
       </p:grpSp>
-      <mc:AlternateContent xmlns:mc="http://schemas.openxmlformats.org/markup-compatibility/2006">
-        <mc:Choice xmlns:a14="http://schemas.microsoft.com/office/drawing/2010/main" Requires="a14">
+      <mc:AlternateContent xmlns:mc="http://schemas.openxmlformats.org/markup-compatibility/2006" xmlns:a14="http://schemas.microsoft.com/office/drawing/2010/main">
+        <mc:Choice Requires="a14">
           <p:sp>
             <p:nvSpPr>
               <p:cNvPr id="4" name="TextBox 3">
@@ -7667,8 +7691,8 @@
             </p:nvSpPr>
             <p:spPr>
               <a:xfrm>
-                <a:off x="-3963130" y="5951516"/>
-                <a:ext cx="6862263" cy="674095"/>
+                <a:off x="-4858480" y="5951516"/>
+                <a:ext cx="7780143" cy="674095"/>
               </a:xfrm>
               <a:prstGeom prst="rect">
                 <a:avLst/>
@@ -7743,7 +7767,7 @@
                           <a:rPr lang="en-GB" sz="2800" b="0" i="1" smtClean="0">
                             <a:latin typeface="Cambria Math" panose="02040503050406030204" pitchFamily="18" charset="0"/>
                           </a:rPr>
-                          <m:t>𝑀𝑒𝑑𝑖𝑐𝑖𝑛𝑒</m:t>
+                          <m:t>𝑃h𝑎𝑟𝑚𝑎𝑐𝑒𝑢𝑡𝑖𝑐𝑎𝑙</m:t>
                         </m:r>
                         <m:r>
                           <a:rPr lang="en-GB" sz="2800" b="0" i="1" smtClean="0">
@@ -7813,7 +7837,7 @@
             </p:txBody>
           </p:sp>
         </mc:Choice>
-        <mc:Fallback>
+        <mc:Fallback xmlns="">
           <p:sp>
             <p:nvSpPr>
               <p:cNvPr id="4" name="TextBox 3">
@@ -7830,8 +7854,8 @@
             </p:nvSpPr>
             <p:spPr>
               <a:xfrm>
-                <a:off x="-3963130" y="5951516"/>
-                <a:ext cx="6862263" cy="674095"/>
+                <a:off x="-4858480" y="5951516"/>
+                <a:ext cx="7780143" cy="674095"/>
               </a:xfrm>
               <a:prstGeom prst="rect">
                 <a:avLst/>
@@ -7911,7 +7935,7 @@
                   <a:latin typeface="Arial" panose="020B0604020202020204" pitchFamily="34" charset="0"/>
                   <a:cs typeface="Arial" panose="020B0604020202020204" pitchFamily="34" charset="0"/>
                 </a:rPr>
-                <a:t>Mean Medicine </a:t>
+                <a:t>Mean Pharmaceutical </a:t>
               </a:r>
             </a:p>
             <a:p>
@@ -8009,8 +8033,8 @@
           </p:spPr>
         </p:pic>
       </p:grpSp>
-      <mc:AlternateContent xmlns:mc="http://schemas.openxmlformats.org/markup-compatibility/2006">
-        <mc:Choice xmlns:a14="http://schemas.microsoft.com/office/drawing/2010/main" Requires="a14">
+      <mc:AlternateContent xmlns:mc="http://schemas.openxmlformats.org/markup-compatibility/2006" xmlns:a14="http://schemas.microsoft.com/office/drawing/2010/main">
+        <mc:Choice Requires="a14">
           <p:sp>
             <p:nvSpPr>
               <p:cNvPr id="107" name="TextBox 106">
@@ -8181,7 +8205,7 @@
             </p:txBody>
           </p:sp>
         </mc:Choice>
-        <mc:Fallback>
+        <mc:Fallback xmlns="">
           <p:sp>
             <p:nvSpPr>
               <p:cNvPr id="107" name="TextBox 106">
@@ -8226,8 +8250,8 @@
           </p:sp>
         </mc:Fallback>
       </mc:AlternateContent>
-      <mc:AlternateContent xmlns:mc="http://schemas.openxmlformats.org/markup-compatibility/2006">
-        <mc:Choice xmlns:a14="http://schemas.microsoft.com/office/drawing/2010/main" Requires="a14">
+      <mc:AlternateContent xmlns:mc="http://schemas.openxmlformats.org/markup-compatibility/2006" xmlns:a14="http://schemas.microsoft.com/office/drawing/2010/main">
+        <mc:Choice Requires="a14">
           <p:sp>
             <p:nvSpPr>
               <p:cNvPr id="108" name="TextBox 107">
@@ -8378,7 +8402,7 @@
             </p:txBody>
           </p:sp>
         </mc:Choice>
-        <mc:Fallback>
+        <mc:Fallback xmlns="">
           <p:sp>
             <p:nvSpPr>
               <p:cNvPr id="108" name="TextBox 107">
@@ -8689,8 +8713,8 @@
           </p:sp>
         </p:grpSp>
       </p:grpSp>
-      <mc:AlternateContent xmlns:mc="http://schemas.openxmlformats.org/markup-compatibility/2006">
-        <mc:Choice xmlns:a14="http://schemas.microsoft.com/office/drawing/2010/main" Requires="a14">
+      <mc:AlternateContent xmlns:mc="http://schemas.openxmlformats.org/markup-compatibility/2006" xmlns:a14="http://schemas.microsoft.com/office/drawing/2010/main">
+        <mc:Choice Requires="a14">
           <p:sp>
             <p:nvSpPr>
               <p:cNvPr id="113" name="TextBox 112">
@@ -8881,7 +8905,7 @@
             </p:txBody>
           </p:sp>
         </mc:Choice>
-        <mc:Fallback>
+        <mc:Fallback xmlns="">
           <p:sp>
             <p:nvSpPr>
               <p:cNvPr id="113" name="TextBox 112">
@@ -9563,8 +9587,8 @@
           </p:grpSp>
         </p:grpSp>
       </p:grpSp>
-      <mc:AlternateContent xmlns:mc="http://schemas.openxmlformats.org/markup-compatibility/2006">
-        <mc:Choice xmlns:a14="http://schemas.microsoft.com/office/drawing/2010/main" Requires="a14">
+      <mc:AlternateContent xmlns:mc="http://schemas.openxmlformats.org/markup-compatibility/2006" xmlns:a14="http://schemas.microsoft.com/office/drawing/2010/main">
+        <mc:Choice Requires="a14">
           <p:sp>
             <p:nvSpPr>
               <p:cNvPr id="128" name="TextBox 127">
@@ -9748,7 +9772,7 @@
             </p:txBody>
           </p:sp>
         </mc:Choice>
-        <mc:Fallback>
+        <mc:Fallback xmlns="">
           <p:sp>
             <p:nvSpPr>
               <p:cNvPr id="128" name="TextBox 127">
@@ -9810,7 +9834,7 @@
             <p:spPr>
               <a:xfrm>
                 <a:off x="12021104" y="12883242"/>
-                <a:ext cx="8125494" cy="927113"/>
+                <a:ext cx="7708520" cy="1134157"/>
               </a:xfrm>
               <a:prstGeom prst="rect">
                 <a:avLst/>
@@ -9827,7 +9851,11 @@
               </a:bodyPr>
               <a:lstStyle/>
               <a:p>
-                <a:pPr/>
+                <a:pPr>
+                  <a:spcAft>
+                    <a:spcPts val="800"/>
+                  </a:spcAft>
+                </a:pPr>
                 <a14:m>
                   <m:oMathPara xmlns:m="http://schemas.openxmlformats.org/officeDocument/2006/math">
                     <m:oMathParaPr>
@@ -9835,91 +9863,139 @@
                     </m:oMathParaPr>
                     <m:oMath xmlns:m="http://schemas.openxmlformats.org/officeDocument/2006/math">
                       <m:r>
-                        <a:rPr lang="en-GB" sz="2800" b="0" i="1" smtClean="0">
+                        <a:rPr lang="en-GB" sz="2800" i="1" smtClean="0">
                           <a:latin typeface="Cambria Math" panose="02040503050406030204" pitchFamily="18" charset="0"/>
+                          <a:ea typeface="Calibri" panose="020F0502020204030204" pitchFamily="34" charset="0"/>
+                          <a:cs typeface="Arial" panose="020B0604020202020204" pitchFamily="34" charset="0"/>
                         </a:rPr>
-                        <m:t>𝑃</m:t>
+                        <m:t>𝐴𝑡</m:t>
                       </m:r>
-                      <m:d>
-                        <m:dPr>
-                          <m:ctrlPr>
-                            <a:rPr lang="en-GB" sz="2800" b="0" i="1" smtClean="0">
-                              <a:latin typeface="Cambria Math" panose="02040503050406030204" pitchFamily="18" charset="0"/>
-                            </a:rPr>
-                          </m:ctrlPr>
-                        </m:dPr>
-                        <m:e>
-                          <m:r>
-                            <a:rPr lang="en-GB" sz="2800" b="0" i="1" smtClean="0">
-                              <a:latin typeface="Cambria Math" panose="02040503050406030204" pitchFamily="18" charset="0"/>
-                            </a:rPr>
-                            <m:t>𝑎𝑡</m:t>
-                          </m:r>
-                          <m:r>
-                            <a:rPr lang="en-GB" sz="2800" b="0" i="1" smtClean="0">
-                              <a:latin typeface="Cambria Math" panose="02040503050406030204" pitchFamily="18" charset="0"/>
-                            </a:rPr>
-                            <m:t> </m:t>
-                          </m:r>
-                          <m:r>
-                            <a:rPr lang="en-GB" sz="2800" b="0" i="1" smtClean="0">
-                              <a:latin typeface="Cambria Math" panose="02040503050406030204" pitchFamily="18" charset="0"/>
-                            </a:rPr>
-                            <m:t>𝑙𝑒𝑎𝑠𝑡</m:t>
-                          </m:r>
-                          <m:r>
-                            <a:rPr lang="en-GB" sz="2800" b="0" i="1" smtClean="0">
-                              <a:latin typeface="Cambria Math" panose="02040503050406030204" pitchFamily="18" charset="0"/>
-                            </a:rPr>
-                            <m:t> </m:t>
-                          </m:r>
-                          <m:r>
-                            <a:rPr lang="en-GB" sz="2800" b="0" i="1" smtClean="0">
-                              <a:latin typeface="Cambria Math" panose="02040503050406030204" pitchFamily="18" charset="0"/>
-                            </a:rPr>
-                            <m:t>𝑜𝑛𝑒</m:t>
-                          </m:r>
-                          <m:r>
-                            <a:rPr lang="en-GB" sz="2800" b="0" i="1" smtClean="0">
-                              <a:latin typeface="Cambria Math" panose="02040503050406030204" pitchFamily="18" charset="0"/>
-                            </a:rPr>
-                            <m:t> </m:t>
-                          </m:r>
-                          <m:r>
-                            <a:rPr lang="en-GB" sz="2800" b="0" i="1" smtClean="0">
-                              <a:latin typeface="Cambria Math" panose="02040503050406030204" pitchFamily="18" charset="0"/>
-                            </a:rPr>
-                            <m:t>𝑅𝑄</m:t>
-                          </m:r>
-                          <m:r>
-                            <a:rPr lang="en-GB" sz="2800" b="0" i="1" smtClean="0">
-                              <a:latin typeface="Cambria Math" panose="02040503050406030204" pitchFamily="18" charset="0"/>
-                            </a:rPr>
-                            <m:t>&gt;</m:t>
-                          </m:r>
-                          <m:r>
-                            <a:rPr lang="en-GB" sz="2800" b="0" i="1" smtClean="0">
-                              <a:latin typeface="Cambria Math" panose="02040503050406030204" pitchFamily="18" charset="0"/>
-                            </a:rPr>
-                            <m:t>𝑡h𝑟𝑒𝑠h𝑜𝑙𝑑</m:t>
-                          </m:r>
-                        </m:e>
-                      </m:d>
                       <m:r>
-                        <a:rPr lang="en-GB" sz="2800" b="0" i="1" smtClean="0">
+                        <a:rPr lang="en-GB" sz="2800" i="1" smtClean="0">
                           <a:latin typeface="Cambria Math" panose="02040503050406030204" pitchFamily="18" charset="0"/>
+                          <a:ea typeface="Calibri" panose="020F0502020204030204" pitchFamily="34" charset="0"/>
+                          <a:cs typeface="Arial" panose="020B0604020202020204" pitchFamily="34" charset="0"/>
+                        </a:rPr>
+                        <m:t> </m:t>
+                      </m:r>
+                      <m:r>
+                        <a:rPr lang="en-GB" sz="2800" i="1" smtClean="0">
+                          <a:latin typeface="Cambria Math" panose="02040503050406030204" pitchFamily="18" charset="0"/>
+                          <a:ea typeface="Calibri" panose="020F0502020204030204" pitchFamily="34" charset="0"/>
+                          <a:cs typeface="Arial" panose="020B0604020202020204" pitchFamily="34" charset="0"/>
+                        </a:rPr>
+                        <m:t>𝑙𝑒𝑎𝑠𝑡</m:t>
+                      </m:r>
+                      <m:r>
+                        <a:rPr lang="en-GB" sz="2800" i="1" smtClean="0">
+                          <a:latin typeface="Cambria Math" panose="02040503050406030204" pitchFamily="18" charset="0"/>
+                          <a:ea typeface="Calibri" panose="020F0502020204030204" pitchFamily="34" charset="0"/>
+                          <a:cs typeface="Arial" panose="020B0604020202020204" pitchFamily="34" charset="0"/>
+                        </a:rPr>
+                        <m:t> </m:t>
+                      </m:r>
+                      <m:r>
+                        <a:rPr lang="en-GB" sz="2800" i="1" smtClean="0">
+                          <a:latin typeface="Cambria Math" panose="02040503050406030204" pitchFamily="18" charset="0"/>
+                          <a:ea typeface="Calibri" panose="020F0502020204030204" pitchFamily="34" charset="0"/>
+                          <a:cs typeface="Arial" panose="020B0604020202020204" pitchFamily="34" charset="0"/>
+                        </a:rPr>
+                        <m:t>𝑜𝑛𝑒</m:t>
+                      </m:r>
+                      <m:r>
+                        <a:rPr lang="en-GB" sz="2800" i="1" smtClean="0">
+                          <a:latin typeface="Cambria Math" panose="02040503050406030204" pitchFamily="18" charset="0"/>
+                          <a:ea typeface="Calibri" panose="020F0502020204030204" pitchFamily="34" charset="0"/>
+                          <a:cs typeface="Arial" panose="020B0604020202020204" pitchFamily="34" charset="0"/>
+                        </a:rPr>
+                        <m:t> </m:t>
+                      </m:r>
+                      <m:r>
+                        <a:rPr lang="en-GB" sz="2800" i="1" smtClean="0">
+                          <a:latin typeface="Cambria Math" panose="02040503050406030204" pitchFamily="18" charset="0"/>
+                          <a:ea typeface="Calibri" panose="020F0502020204030204" pitchFamily="34" charset="0"/>
+                          <a:cs typeface="Arial" panose="020B0604020202020204" pitchFamily="34" charset="0"/>
+                        </a:rPr>
+                        <m:t>𝑅𝑄</m:t>
+                      </m:r>
+                      <m:r>
+                        <a:rPr lang="en-GB" sz="2800" i="1" smtClean="0">
+                          <a:latin typeface="Cambria Math" panose="02040503050406030204" pitchFamily="18" charset="0"/>
+                          <a:ea typeface="Calibri" panose="020F0502020204030204" pitchFamily="34" charset="0"/>
+                          <a:cs typeface="Arial" panose="020B0604020202020204" pitchFamily="34" charset="0"/>
+                        </a:rPr>
+                        <m:t>&gt;</m:t>
+                      </m:r>
+                      <m:r>
+                        <a:rPr lang="en-GB" sz="2800" i="1" smtClean="0">
+                          <a:latin typeface="Cambria Math" panose="02040503050406030204" pitchFamily="18" charset="0"/>
+                          <a:ea typeface="Calibri" panose="020F0502020204030204" pitchFamily="34" charset="0"/>
+                          <a:cs typeface="Arial" panose="020B0604020202020204" pitchFamily="34" charset="0"/>
+                        </a:rPr>
+                        <m:t>𝑡h𝑟𝑒𝑠h𝑜𝑙𝑑</m:t>
+                      </m:r>
+                      <m:r>
+                        <a:rPr lang="en-GB" sz="2800" i="1" smtClean="0">
+                          <a:latin typeface="Cambria Math" panose="02040503050406030204" pitchFamily="18" charset="0"/>
+                          <a:ea typeface="Calibri" panose="020F0502020204030204" pitchFamily="34" charset="0"/>
+                          <a:cs typeface="Arial" panose="020B0604020202020204" pitchFamily="34" charset="0"/>
                         </a:rPr>
                         <m:t>=</m:t>
                       </m:r>
+                      <m:r>
+                        <a:rPr lang="en-GB" sz="2800" i="1" smtClean="0">
+                          <a:latin typeface="Cambria Math" panose="02040503050406030204" pitchFamily="18" charset="0"/>
+                          <a:ea typeface="Calibri" panose="020F0502020204030204" pitchFamily="34" charset="0"/>
+                          <a:cs typeface="Arial" panose="020B0604020202020204" pitchFamily="34" charset="0"/>
+                        </a:rPr>
+                        <m:t>𝑅</m:t>
+                      </m:r>
+                      <m:sSub>
+                        <m:sSubPr>
+                          <m:ctrlPr>
+                            <a:rPr lang="en-GB" sz="2800" i="1">
+                              <a:latin typeface="Cambria Math" panose="02040503050406030204" pitchFamily="18" charset="0"/>
+                              <a:ea typeface="Calibri" panose="020F0502020204030204" pitchFamily="34" charset="0"/>
+                              <a:cs typeface="Arial" panose="020B0604020202020204" pitchFamily="34" charset="0"/>
+                            </a:rPr>
+                          </m:ctrlPr>
+                        </m:sSubPr>
+                        <m:e>
+                          <m:r>
+                            <a:rPr lang="en-GB" sz="2800" i="1">
+                              <a:latin typeface="Cambria Math" panose="02040503050406030204" pitchFamily="18" charset="0"/>
+                              <a:ea typeface="Calibri" panose="020F0502020204030204" pitchFamily="34" charset="0"/>
+                              <a:cs typeface="Arial" panose="020B0604020202020204" pitchFamily="34" charset="0"/>
+                            </a:rPr>
+                            <m:t>𝑄</m:t>
+                          </m:r>
+                        </m:e>
+                        <m:sub>
+                          <m:r>
+                            <a:rPr lang="en-GB" sz="2800" i="1">
+                              <a:latin typeface="Cambria Math" panose="02040503050406030204" pitchFamily="18" charset="0"/>
+                              <a:ea typeface="Calibri" panose="020F0502020204030204" pitchFamily="34" charset="0"/>
+                              <a:cs typeface="Arial" panose="020B0604020202020204" pitchFamily="34" charset="0"/>
+                            </a:rPr>
+                            <m:t>𝑒𝑡h𝑖𝑛𝑦𝑙𝑒𝑠𝑡𝑟𝑎𝑑𝑖𝑜𝑙</m:t>
+                          </m:r>
+                        </m:sub>
+                      </m:sSub>
                     </m:oMath>
                   </m:oMathPara>
                 </a14:m>
-                <a:endParaRPr lang="en-GB" sz="2800" b="0" i="1" dirty="0">
+                <a:endParaRPr lang="en-GB" sz="2800" i="1" dirty="0">
                   <a:latin typeface="Cambria Math" panose="02040503050406030204" pitchFamily="18" charset="0"/>
+                  <a:ea typeface="Calibri" panose="020F0502020204030204" pitchFamily="34" charset="0"/>
+                  <a:cs typeface="Arial" panose="020B0604020202020204" pitchFamily="34" charset="0"/>
                 </a:endParaRPr>
               </a:p>
               <a:p>
-                <a:pPr/>
+                <a:pPr>
+                  <a:spcAft>
+                    <a:spcPts val="800"/>
+                  </a:spcAft>
+                </a:pPr>
                 <a14:m>
                   <m:oMathPara xmlns:m="http://schemas.openxmlformats.org/officeDocument/2006/math">
                     <m:oMathParaPr>
@@ -9927,134 +10003,107 @@
                     </m:oMathParaPr>
                     <m:oMath xmlns:m="http://schemas.openxmlformats.org/officeDocument/2006/math">
                       <m:r>
-                        <a:rPr lang="en-GB" sz="2800" b="0" i="1" smtClean="0">
+                        <a:rPr lang="en-GB" sz="2800" i="1">
                           <a:latin typeface="Cambria Math" panose="02040503050406030204" pitchFamily="18" charset="0"/>
+                          <a:ea typeface="Calibri" panose="020F0502020204030204" pitchFamily="34" charset="0"/>
+                          <a:cs typeface="Arial" panose="020B0604020202020204" pitchFamily="34" charset="0"/>
                         </a:rPr>
-                        <m:t>𝑃</m:t>
+                        <m:t>∪</m:t>
                       </m:r>
-                      <m:d>
-                        <m:dPr>
-                          <m:ctrlPr>
-                            <a:rPr lang="en-GB" sz="2800" b="0" i="1" smtClean="0">
-                              <a:latin typeface="Cambria Math" panose="02040503050406030204" pitchFamily="18" charset="0"/>
-                            </a:rPr>
-                          </m:ctrlPr>
-                        </m:dPr>
-                        <m:e>
-                          <m:sSub>
-                            <m:sSubPr>
-                              <m:ctrlPr>
-                                <a:rPr lang="en-GB" sz="2800" b="0" i="1" smtClean="0">
-                                  <a:latin typeface="Cambria Math" panose="02040503050406030204" pitchFamily="18" charset="0"/>
-                                </a:rPr>
-                              </m:ctrlPr>
-                            </m:sSubPr>
-                            <m:e>
-                              <m:r>
-                                <a:rPr lang="en-GB" sz="2800" b="0" i="1" smtClean="0">
-                                  <a:latin typeface="Cambria Math" panose="02040503050406030204" pitchFamily="18" charset="0"/>
-                                </a:rPr>
-                                <m:t>𝑅𝑄</m:t>
-                              </m:r>
-                            </m:e>
-                            <m:sub>
-                              <m:r>
-                                <a:rPr lang="en-GB" sz="2800" b="0" i="1" smtClean="0">
-                                  <a:latin typeface="Cambria Math" panose="02040503050406030204" pitchFamily="18" charset="0"/>
-                                </a:rPr>
-                                <m:t>𝑐𝑖𝑝𝑟𝑜𝑓𝑙𝑜𝑥𝑎𝑐𝑖𝑛</m:t>
-                              </m:r>
-                            </m:sub>
-                          </m:sSub>
-                          <m:r>
-                            <a:rPr lang="en-GB" sz="2800" b="0" i="1" smtClean="0">
-                              <a:latin typeface="Cambria Math" panose="02040503050406030204" pitchFamily="18" charset="0"/>
-                            </a:rPr>
-                            <m:t>&gt;1</m:t>
-                          </m:r>
-                        </m:e>
-                      </m:d>
                       <m:r>
-                        <a:rPr lang="en-GB" sz="2800" b="0" i="1" smtClean="0">
+                        <a:rPr lang="en-GB" sz="2800" i="1">
                           <a:latin typeface="Cambria Math" panose="02040503050406030204" pitchFamily="18" charset="0"/>
-                          <a:ea typeface="Cambria Math" panose="02040503050406030204" pitchFamily="18" charset="0"/>
+                          <a:ea typeface="Calibri" panose="020F0502020204030204" pitchFamily="34" charset="0"/>
+                          <a:cs typeface="Arial" panose="020B0604020202020204" pitchFamily="34" charset="0"/>
                         </a:rPr>
-                        <m:t>∩</m:t>
+                        <m:t>𝑅</m:t>
                       </m:r>
-                      <m:d>
-                        <m:dPr>
-                          <m:begChr m:val="["/>
-                          <m:endChr m:val="]"/>
-                          <m:ctrlPr>
-                            <a:rPr lang="en-GB" sz="2800" b="0" i="1" smtClean="0">
-                              <a:latin typeface="Cambria Math" panose="02040503050406030204" pitchFamily="18" charset="0"/>
-                              <a:ea typeface="Cambria Math" panose="02040503050406030204" pitchFamily="18" charset="0"/>
-                            </a:rPr>
-                          </m:ctrlPr>
-                        </m:dPr>
-                        <m:e>
-                          <m:r>
-                            <a:rPr lang="en-GB" sz="2800" b="0" i="1" smtClean="0">
-                              <a:latin typeface="Cambria Math" panose="02040503050406030204" pitchFamily="18" charset="0"/>
-                              <a:ea typeface="Cambria Math" panose="02040503050406030204" pitchFamily="18" charset="0"/>
-                            </a:rPr>
-                            <m:t>…</m:t>
-                          </m:r>
-                        </m:e>
-                      </m:d>
-                      <m:r>
-                        <a:rPr lang="en-GB" sz="2800" b="0" i="1" smtClean="0">
-                          <a:latin typeface="Cambria Math" panose="02040503050406030204" pitchFamily="18" charset="0"/>
-                          <a:ea typeface="Cambria Math" panose="02040503050406030204" pitchFamily="18" charset="0"/>
-                        </a:rPr>
-                        <m:t>∩</m:t>
-                      </m:r>
-                      <m:d>
-                        <m:dPr>
+                      <m:sSub>
+                        <m:sSubPr>
                           <m:ctrlPr>
                             <a:rPr lang="en-GB" sz="2800" i="1">
                               <a:latin typeface="Cambria Math" panose="02040503050406030204" pitchFamily="18" charset="0"/>
+                              <a:ea typeface="Calibri" panose="020F0502020204030204" pitchFamily="34" charset="0"/>
+                              <a:cs typeface="Arial" panose="020B0604020202020204" pitchFamily="34" charset="0"/>
                             </a:rPr>
                           </m:ctrlPr>
-                        </m:dPr>
+                        </m:sSubPr>
                         <m:e>
-                          <m:sSub>
-                            <m:sSubPr>
-                              <m:ctrlPr>
-                                <a:rPr lang="en-GB" sz="2800" i="1">
-                                  <a:latin typeface="Cambria Math" panose="02040503050406030204" pitchFamily="18" charset="0"/>
-                                </a:rPr>
-                              </m:ctrlPr>
-                            </m:sSubPr>
-                            <m:e>
-                              <m:r>
-                                <a:rPr lang="en-GB" sz="2800" i="1">
-                                  <a:latin typeface="Cambria Math" panose="02040503050406030204" pitchFamily="18" charset="0"/>
-                                </a:rPr>
-                                <m:t>𝑅𝑄</m:t>
-                              </m:r>
-                            </m:e>
-                            <m:sub>
-                              <m:r>
-                                <a:rPr lang="en-GB" sz="2800" b="0" i="1" smtClean="0">
-                                  <a:latin typeface="Cambria Math" panose="02040503050406030204" pitchFamily="18" charset="0"/>
-                                </a:rPr>
-                                <m:t>𝑝𝑎𝑟𝑎𝑐𝑒𝑡𝑎𝑚𝑜𝑙</m:t>
-                              </m:r>
-                            </m:sub>
-                          </m:sSub>
                           <m:r>
                             <a:rPr lang="en-GB" sz="2800" i="1">
                               <a:latin typeface="Cambria Math" panose="02040503050406030204" pitchFamily="18" charset="0"/>
+                              <a:ea typeface="Calibri" panose="020F0502020204030204" pitchFamily="34" charset="0"/>
+                              <a:cs typeface="Arial" panose="020B0604020202020204" pitchFamily="34" charset="0"/>
                             </a:rPr>
-                            <m:t>&gt;1</m:t>
+                            <m:t>𝑄</m:t>
                           </m:r>
                         </m:e>
-                      </m:d>
+                        <m:sub>
+                          <m:r>
+                            <a:rPr lang="en-GB" sz="2800" i="1">
+                              <a:latin typeface="Cambria Math" panose="02040503050406030204" pitchFamily="18" charset="0"/>
+                              <a:ea typeface="Calibri" panose="020F0502020204030204" pitchFamily="34" charset="0"/>
+                              <a:cs typeface="Arial" panose="020B0604020202020204" pitchFamily="34" charset="0"/>
+                            </a:rPr>
+                            <m:t>𝑒𝑠𝑡𝑟𝑎𝑑𝑖𝑜𝑙</m:t>
+                          </m:r>
+                        </m:sub>
+                      </m:sSub>
+                      <m:r>
+                        <a:rPr lang="en-GB" sz="2800" i="1">
+                          <a:latin typeface="Cambria Math" panose="02040503050406030204" pitchFamily="18" charset="0"/>
+                          <a:ea typeface="Calibri" panose="020F0502020204030204" pitchFamily="34" charset="0"/>
+                          <a:cs typeface="Arial" panose="020B0604020202020204" pitchFamily="34" charset="0"/>
+                        </a:rPr>
+                        <m:t>…∪</m:t>
+                      </m:r>
+                      <m:r>
+                        <a:rPr lang="en-GB" sz="2800" i="1">
+                          <a:latin typeface="Cambria Math" panose="02040503050406030204" pitchFamily="18" charset="0"/>
+                          <a:ea typeface="Calibri" panose="020F0502020204030204" pitchFamily="34" charset="0"/>
+                          <a:cs typeface="Arial" panose="020B0604020202020204" pitchFamily="34" charset="0"/>
+                        </a:rPr>
+                        <m:t>𝑅</m:t>
+                      </m:r>
+                      <m:sSub>
+                        <m:sSubPr>
+                          <m:ctrlPr>
+                            <a:rPr lang="en-GB" sz="2800" i="1">
+                              <a:latin typeface="Cambria Math" panose="02040503050406030204" pitchFamily="18" charset="0"/>
+                              <a:ea typeface="Calibri" panose="020F0502020204030204" pitchFamily="34" charset="0"/>
+                              <a:cs typeface="Arial" panose="020B0604020202020204" pitchFamily="34" charset="0"/>
+                            </a:rPr>
+                          </m:ctrlPr>
+                        </m:sSubPr>
+                        <m:e>
+                          <m:r>
+                            <a:rPr lang="en-GB" sz="2800" i="1">
+                              <a:latin typeface="Cambria Math" panose="02040503050406030204" pitchFamily="18" charset="0"/>
+                              <a:ea typeface="Calibri" panose="020F0502020204030204" pitchFamily="34" charset="0"/>
+                              <a:cs typeface="Arial" panose="020B0604020202020204" pitchFamily="34" charset="0"/>
+                            </a:rPr>
+                            <m:t>𝑄</m:t>
+                          </m:r>
+                        </m:e>
+                        <m:sub>
+                          <m:r>
+                            <a:rPr lang="en-GB" sz="2800" i="1">
+                              <a:latin typeface="Cambria Math" panose="02040503050406030204" pitchFamily="18" charset="0"/>
+                              <a:ea typeface="Calibri" panose="020F0502020204030204" pitchFamily="34" charset="0"/>
+                              <a:cs typeface="Arial" panose="020B0604020202020204" pitchFamily="34" charset="0"/>
+                            </a:rPr>
+                            <m:t>𝑝𝑎𝑟𝑎𝑐𝑒𝑡𝑎𝑚𝑜𝑙</m:t>
+                          </m:r>
+                        </m:sub>
+                      </m:sSub>
                     </m:oMath>
                   </m:oMathPara>
                 </a14:m>
-                <a:endParaRPr lang="en-GB" sz="2800" dirty="0"/>
+                <a:endParaRPr lang="en-GB" sz="2800" dirty="0">
+                  <a:latin typeface="Calibri" panose="020F0502020204030204" pitchFamily="34" charset="0"/>
+                  <a:ea typeface="Calibri" panose="020F0502020204030204" pitchFamily="34" charset="0"/>
+                  <a:cs typeface="Arial" panose="020B0604020202020204" pitchFamily="34" charset="0"/>
+                </a:endParaRPr>
               </a:p>
             </p:txBody>
           </p:sp>
@@ -10077,7 +10126,7 @@
             <p:spPr>
               <a:xfrm>
                 <a:off x="12021104" y="12883242"/>
-                <a:ext cx="8125494" cy="927113"/>
+                <a:ext cx="7708520" cy="1134157"/>
               </a:xfrm>
               <a:prstGeom prst="rect">
                 <a:avLst/>

</xml_diff>